<commit_message>
Changes to be committed: 	modified:   Back-End Programming.pptx
</commit_message>
<xml_diff>
--- a/Back-End Programming.pptx
+++ b/Back-End Programming.pptx
@@ -21,6 +21,7 @@
     <p:sldId id="269" r:id="rId15"/>
     <p:sldId id="270" r:id="rId16"/>
     <p:sldId id="271" r:id="rId17"/>
+    <p:sldId id="272" r:id="rId18"/>
   </p:sldIdLst>
   <p:sldSz cx="12192000" cy="6858000"/>
   <p:notesSz cx="6858000" cy="9144000"/>
@@ -119,6 +120,11 @@
       </a:defRPr>
     </a:lvl9pPr>
   </p:defaultTextStyle>
+  <p:extLst>
+    <p:ext uri="{EFAFB233-063F-42B5-8137-9DF3F51BA10A}">
+      <p15:sldGuideLst xmlns:p15="http://schemas.microsoft.com/office/powerpoint/2012/main"/>
+    </p:ext>
+  </p:extLst>
 </p:presentation>
 </file>
 
@@ -5436,6 +5442,191 @@
 </p:sld>
 </file>
 
+<file path=ppt/slides/slide17.xml><?xml version="1.0" encoding="utf-8"?>
+<p:sld xmlns:a="http://schemas.openxmlformats.org/drawingml/2006/main" xmlns:r="http://schemas.openxmlformats.org/officeDocument/2006/relationships" xmlns:p="http://schemas.openxmlformats.org/presentationml/2006/main">
+  <p:cSld>
+    <p:spTree>
+      <p:nvGrpSpPr>
+        <p:cNvPr id="1" name=""/>
+        <p:cNvGrpSpPr/>
+        <p:nvPr/>
+      </p:nvGrpSpPr>
+      <p:grpSpPr>
+        <a:xfrm>
+          <a:off x="0" y="0"/>
+          <a:ext cx="0" cy="0"/>
+          <a:chOff x="0" y="0"/>
+          <a:chExt cx="0" cy="0"/>
+        </a:xfrm>
+      </p:grpSpPr>
+      <p:sp>
+        <p:nvSpPr>
+          <p:cNvPr id="2" name="Title 1">
+            <a:extLst>
+              <a:ext uri="{FF2B5EF4-FFF2-40B4-BE49-F238E27FC236}">
+                <a16:creationId xmlns:a16="http://schemas.microsoft.com/office/drawing/2014/main" id="{89E8AEB0-D556-4E54-5353-A2275CD73CD3}"/>
+              </a:ext>
+            </a:extLst>
+          </p:cNvPr>
+          <p:cNvSpPr>
+            <a:spLocks noGrp="1"/>
+          </p:cNvSpPr>
+          <p:nvPr>
+            <p:ph type="title"/>
+          </p:nvPr>
+        </p:nvSpPr>
+        <p:spPr/>
+        <p:txBody>
+          <a:bodyPr/>
+          <a:lstStyle/>
+          <a:p>
+            <a:r>
+              <a:rPr lang="en-US" dirty="0"/>
+              <a:t>Lets Build Delete Function</a:t>
+            </a:r>
+          </a:p>
+        </p:txBody>
+      </p:sp>
+      <p:sp>
+        <p:nvSpPr>
+          <p:cNvPr id="3" name="Content Placeholder 2">
+            <a:extLst>
+              <a:ext uri="{FF2B5EF4-FFF2-40B4-BE49-F238E27FC236}">
+                <a16:creationId xmlns:a16="http://schemas.microsoft.com/office/drawing/2014/main" id="{60123BC8-9063-974F-2E8C-A2377C86AAF0}"/>
+              </a:ext>
+            </a:extLst>
+          </p:cNvPr>
+          <p:cNvSpPr>
+            <a:spLocks noGrp="1"/>
+          </p:cNvSpPr>
+          <p:nvPr>
+            <p:ph idx="1"/>
+          </p:nvPr>
+        </p:nvSpPr>
+        <p:spPr>
+          <a:xfrm>
+            <a:off x="3776989" y="1845620"/>
+            <a:ext cx="7315200" cy="2575378"/>
+          </a:xfrm>
+        </p:spPr>
+        <p:txBody>
+          <a:bodyPr>
+            <a:normAutofit/>
+          </a:bodyPr>
+          <a:lstStyle/>
+          <a:p>
+            <a:pPr algn="l"/>
+            <a:r>
+              <a:rPr lang="en-US" b="1" i="0" dirty="0">
+                <a:solidFill>
+                  <a:srgbClr val="4D5B7C"/>
+                </a:solidFill>
+                <a:effectLst/>
+                <a:latin typeface="Epilogue"/>
+              </a:rPr>
+              <a:t>Task.query.get_or_404({{id}})</a:t>
+            </a:r>
+          </a:p>
+          <a:p>
+            <a:pPr algn="l"/>
+            <a:r>
+              <a:rPr lang="en-US" b="1" dirty="0">
+                <a:solidFill>
+                  <a:srgbClr val="4D5B7C"/>
+                </a:solidFill>
+                <a:latin typeface="Epilogue"/>
+              </a:rPr>
+              <a:t>db.session.delete({{data}})</a:t>
+            </a:r>
+          </a:p>
+          <a:p>
+            <a:pPr algn="l"/>
+            <a:r>
+              <a:rPr lang="en-US" b="1" i="0" dirty="0">
+                <a:solidFill>
+                  <a:srgbClr val="4D5B7C"/>
+                </a:solidFill>
+                <a:effectLst/>
+                <a:latin typeface="Epilogue"/>
+              </a:rPr>
+              <a:t>db.session.commit({{null}})</a:t>
+            </a:r>
+          </a:p>
+          <a:p>
+            <a:pPr algn="l"/>
+            <a:r>
+              <a:rPr lang="en-US" b="1" i="0" dirty="0">
+                <a:solidFill>
+                  <a:srgbClr val="4D5B7C"/>
+                </a:solidFill>
+                <a:effectLst/>
+                <a:latin typeface="Epilogue"/>
+              </a:rPr>
+              <a:t>redirect(url_for({{function}}))</a:t>
+            </a:r>
+          </a:p>
+        </p:txBody>
+      </p:sp>
+      <p:pic>
+        <p:nvPicPr>
+          <p:cNvPr id="2050" name="Picture 2" descr="Sharif University of Technology - Wikipedia">
+            <a:extLst>
+              <a:ext uri="{FF2B5EF4-FFF2-40B4-BE49-F238E27FC236}">
+                <a16:creationId xmlns:a16="http://schemas.microsoft.com/office/drawing/2014/main" id="{05E92EE3-DDCE-B039-50AD-12B91F419647}"/>
+              </a:ext>
+            </a:extLst>
+          </p:cNvPr>
+          <p:cNvPicPr>
+            <a:picLocks noChangeAspect="1" noChangeArrowheads="1"/>
+          </p:cNvPicPr>
+          <p:nvPr/>
+        </p:nvPicPr>
+        <p:blipFill>
+          <a:blip r:embed="rId2">
+            <a:extLst>
+              <a:ext uri="{28A0092B-C50C-407E-A947-70E740481C1C}">
+                <a14:useLocalDpi xmlns:a14="http://schemas.microsoft.com/office/drawing/2010/main" val="0"/>
+              </a:ext>
+            </a:extLst>
+          </a:blip>
+          <a:srcRect/>
+          <a:stretch>
+            <a:fillRect/>
+          </a:stretch>
+        </p:blipFill>
+        <p:spPr bwMode="auto">
+          <a:xfrm>
+            <a:off x="10763306" y="5922628"/>
+            <a:ext cx="842324" cy="873252"/>
+          </a:xfrm>
+          <a:prstGeom prst="rect">
+            <a:avLst/>
+          </a:prstGeom>
+          <a:noFill/>
+          <a:extLst>
+            <a:ext uri="{909E8E84-426E-40DD-AFC4-6F175D3DCCD1}">
+              <a14:hiddenFill xmlns:a14="http://schemas.microsoft.com/office/drawing/2010/main">
+                <a:solidFill>
+                  <a:srgbClr val="FFFFFF"/>
+                </a:solidFill>
+              </a14:hiddenFill>
+            </a:ext>
+          </a:extLst>
+        </p:spPr>
+      </p:pic>
+    </p:spTree>
+    <p:extLst>
+      <p:ext uri="{BB962C8B-B14F-4D97-AF65-F5344CB8AC3E}">
+        <p14:creationId xmlns:p14="http://schemas.microsoft.com/office/powerpoint/2010/main" val="362147927"/>
+      </p:ext>
+    </p:extLst>
+  </p:cSld>
+  <p:clrMapOvr>
+    <a:masterClrMapping/>
+  </p:clrMapOvr>
+</p:sld>
+</file>
+
 <file path=ppt/slides/slide2.xml><?xml version="1.0" encoding="utf-8"?>
 <p:sld xmlns:a="http://schemas.openxmlformats.org/drawingml/2006/main" xmlns:r="http://schemas.openxmlformats.org/officeDocument/2006/relationships" xmlns:p="http://schemas.openxmlformats.org/presentationml/2006/main">
   <p:cSld>

</xml_diff>